<commit_message>
Update REST vs SOAP presentation.
</commit_message>
<xml_diff>
--- a/REST vs SOAP.pptx
+++ b/REST vs SOAP.pptx
@@ -2999,12 +2999,55 @@
             <p:ph type="subTitle" idx="1"/>
           </p:nvPr>
         </p:nvSpPr>
-        <p:spPr/>
-        <p:txBody>
-          <a:bodyPr/>
-          <a:lstStyle/>
-          <a:p>
-            <a:endParaRPr lang="en-US"/>
+        <p:spPr>
+          <a:xfrm>
+            <a:off x="1524000" y="3916670"/>
+            <a:ext cx="9144000" cy="1655762"/>
+          </a:xfrm>
+        </p:spPr>
+        <p:txBody>
+          <a:bodyPr>
+            <a:normAutofit/>
+          </a:bodyPr>
+          <a:lstStyle/>
+          <a:p>
+            <a:r>
+              <a:rPr lang="en-US" sz="2000" dirty="0" smtClean="0">
+                <a:solidFill>
+                  <a:schemeClr val="bg1">
+                    <a:lumMod val="65000"/>
+                  </a:schemeClr>
+                </a:solidFill>
+              </a:rPr>
+              <a:t>REST as an HTTP API </a:t>
+            </a:r>
+            <a:r>
+              <a:rPr lang="en-US" sz="2000" i="1" dirty="0" smtClean="0">
+                <a:solidFill>
+                  <a:schemeClr val="bg1">
+                    <a:lumMod val="65000"/>
+                  </a:schemeClr>
+                </a:solidFill>
+              </a:rPr>
+              <a:t>protocol</a:t>
+            </a:r>
+            <a:r>
+              <a:rPr lang="en-US" sz="2000" dirty="0" smtClean="0">
+                <a:solidFill>
+                  <a:schemeClr val="bg1">
+                    <a:lumMod val="65000"/>
+                  </a:schemeClr>
+                </a:solidFill>
+              </a:rPr>
+              <a:t>, not as an architectural style as per Roy Fielding</a:t>
+            </a:r>
+            <a:endParaRPr lang="en-US" sz="2000" i="1" dirty="0">
+              <a:solidFill>
+                <a:schemeClr val="bg1">
+                  <a:lumMod val="65000"/>
+                </a:schemeClr>
+              </a:solidFill>
+            </a:endParaRPr>
           </a:p>
         </p:txBody>
       </p:sp>

</xml_diff>